<commit_message>
diapositivas sobre condiciones ANOVA
</commit_message>
<xml_diff>
--- a/clases/Tema IV - ANOVA - supuestos.pptx
+++ b/clases/Tema IV - ANOVA - supuestos.pptx
@@ -196,7 +196,7 @@
   <pc:docChgLst>
     <pc:chgData name="edlin guerra" userId="d52177a9150211f7" providerId="LiveId" clId="{1D5C1BF5-2544-4BBF-B69A-3DB33E7BAA21}"/>
     <pc:docChg chg="undo custSel addSld delSld modSld sldOrd">
-      <pc:chgData name="edlin guerra" userId="d52177a9150211f7" providerId="LiveId" clId="{1D5C1BF5-2544-4BBF-B69A-3DB33E7BAA21}" dt="2025-10-01T15:52:54.353" v="552" actId="20577"/>
+      <pc:chgData name="edlin guerra" userId="d52177a9150211f7" providerId="LiveId" clId="{1D5C1BF5-2544-4BBF-B69A-3DB33E7BAA21}" dt="2025-10-07T15:54:31.425" v="553" actId="20577"/>
       <pc:docMkLst>
         <pc:docMk/>
       </pc:docMkLst>
@@ -308,14 +308,6 @@
             <ac:spMk id="7" creationId="{9B62AB49-085E-4E3B-6336-55979FB2A5A4}"/>
           </ac:spMkLst>
         </pc:spChg>
-        <pc:graphicFrameChg chg="add del mod replId">
-          <ac:chgData name="edlin guerra" userId="d52177a9150211f7" providerId="LiveId" clId="{1D5C1BF5-2544-4BBF-B69A-3DB33E7BAA21}" dt="2025-10-01T04:39:49.921" v="195"/>
-          <ac:graphicFrameMkLst>
-            <pc:docMk/>
-            <pc:sldMk cId="0" sldId="265"/>
-            <ac:graphicFrameMk id="8" creationId="{9B62AB49-085E-4E3B-6336-55979FB2A5A4}"/>
-          </ac:graphicFrameMkLst>
-        </pc:graphicFrameChg>
         <pc:picChg chg="add mod">
           <ac:chgData name="edlin guerra" userId="d52177a9150211f7" providerId="LiveId" clId="{1D5C1BF5-2544-4BBF-B69A-3DB33E7BAA21}" dt="2025-10-01T04:19:36.855" v="155" actId="1076"/>
           <ac:picMkLst>
@@ -324,36 +316,12 @@
             <ac:picMk id="3" creationId="{9490D644-46C9-1B3C-232F-6C833D40D90D}"/>
           </ac:picMkLst>
         </pc:picChg>
-        <pc:picChg chg="add del">
-          <ac:chgData name="edlin guerra" userId="d52177a9150211f7" providerId="LiveId" clId="{1D5C1BF5-2544-4BBF-B69A-3DB33E7BAA21}" dt="2025-10-01T04:27:04.988" v="169" actId="478"/>
-          <ac:picMkLst>
-            <pc:docMk/>
-            <pc:sldMk cId="0" sldId="265"/>
-            <ac:picMk id="4" creationId="{8433049F-F314-EEC2-7B24-7D4700D62286}"/>
-          </ac:picMkLst>
-        </pc:picChg>
-        <pc:picChg chg="add del mod">
-          <ac:chgData name="edlin guerra" userId="d52177a9150211f7" providerId="LiveId" clId="{1D5C1BF5-2544-4BBF-B69A-3DB33E7BAA21}" dt="2025-10-01T04:27:04.401" v="168" actId="931"/>
-          <ac:picMkLst>
-            <pc:docMk/>
-            <pc:sldMk cId="0" sldId="265"/>
-            <ac:picMk id="6" creationId="{DABD4DC2-8A03-7691-BD1D-30D822C45358}"/>
-          </ac:picMkLst>
-        </pc:picChg>
         <pc:picChg chg="add del mod">
           <ac:chgData name="edlin guerra" userId="d52177a9150211f7" providerId="LiveId" clId="{1D5C1BF5-2544-4BBF-B69A-3DB33E7BAA21}" dt="2025-10-01T04:27:06.266" v="170" actId="478"/>
           <ac:picMkLst>
             <pc:docMk/>
             <pc:sldMk cId="0" sldId="265"/>
             <ac:picMk id="1026" creationId="{D76156BC-7F2F-3AE5-70B0-5F3955DE110F}"/>
-          </ac:picMkLst>
-        </pc:picChg>
-        <pc:picChg chg="del mod">
-          <ac:chgData name="edlin guerra" userId="d52177a9150211f7" providerId="LiveId" clId="{1D5C1BF5-2544-4BBF-B69A-3DB33E7BAA21}" dt="2025-10-01T04:19:06.966" v="146" actId="478"/>
-          <ac:picMkLst>
-            <pc:docMk/>
-            <pc:sldMk cId="0" sldId="265"/>
-            <ac:picMk id="7182" creationId="{9267DE14-BA20-4786-84BB-8F96078B5691}"/>
           </ac:picMkLst>
         </pc:picChg>
       </pc:sldChg>
@@ -371,14 +339,6 @@
             <ac:spMk id="9230" creationId="{9E0BFA5A-4B1E-4786-AF5B-678A196833D7}"/>
           </ac:spMkLst>
         </pc:spChg>
-        <pc:spChg chg="del">
-          <ac:chgData name="edlin guerra" userId="d52177a9150211f7" providerId="LiveId" clId="{1D5C1BF5-2544-4BBF-B69A-3DB33E7BAA21}" dt="2025-10-01T05:54:06.940" v="485" actId="478"/>
-          <ac:spMkLst>
-            <pc:docMk/>
-            <pc:sldMk cId="0" sldId="268"/>
-            <ac:spMk id="9231" creationId="{7F61AA02-B243-4571-8CFD-D1B32923329D}"/>
-          </ac:spMkLst>
-        </pc:spChg>
         <pc:graphicFrameChg chg="mod modGraphic">
           <ac:chgData name="edlin guerra" userId="d52177a9150211f7" providerId="LiveId" clId="{1D5C1BF5-2544-4BBF-B69A-3DB33E7BAA21}" dt="2025-10-01T15:52:54.353" v="552" actId="20577"/>
           <ac:graphicFrameMkLst>
@@ -394,14 +354,6 @@
           <pc:docMk/>
           <pc:sldMk cId="0" sldId="271"/>
         </pc:sldMkLst>
-        <pc:spChg chg="add del mod">
-          <ac:chgData name="edlin guerra" userId="d52177a9150211f7" providerId="LiveId" clId="{1D5C1BF5-2544-4BBF-B69A-3DB33E7BAA21}" dt="2025-10-01T05:31:34.312" v="312" actId="478"/>
-          <ac:spMkLst>
-            <pc:docMk/>
-            <pc:sldMk cId="0" sldId="271"/>
-            <ac:spMk id="2" creationId="{6AEF6B8D-ED3D-9869-3F76-207B0ED658A3}"/>
-          </ac:spMkLst>
-        </pc:spChg>
         <pc:spChg chg="add mod">
           <ac:chgData name="edlin guerra" userId="d52177a9150211f7" providerId="LiveId" clId="{1D5C1BF5-2544-4BBF-B69A-3DB33E7BAA21}" dt="2025-10-01T05:39:44.155" v="388" actId="1038"/>
           <ac:spMkLst>
@@ -424,14 +376,6 @@
             <pc:docMk/>
             <pc:sldMk cId="0" sldId="271"/>
             <ac:spMk id="4099" creationId="{69DBE356-6EAB-B6C2-B327-7C952C9915E0}"/>
-          </ac:spMkLst>
-        </pc:spChg>
-        <pc:spChg chg="del mod">
-          <ac:chgData name="edlin guerra" userId="d52177a9150211f7" providerId="LiveId" clId="{1D5C1BF5-2544-4BBF-B69A-3DB33E7BAA21}" dt="2025-10-01T05:31:30.760" v="311" actId="478"/>
-          <ac:spMkLst>
-            <pc:docMk/>
-            <pc:sldMk cId="0" sldId="271"/>
-            <ac:spMk id="4100" creationId="{D821B039-8DDE-F66B-15D1-E87FB3C28851}"/>
           </ac:spMkLst>
         </pc:spChg>
         <pc:spChg chg="mod">
@@ -458,14 +402,6 @@
             <ac:spMk id="4106" creationId="{24331D93-DDD6-78DB-B293-C006F42AFA99}"/>
           </ac:spMkLst>
         </pc:spChg>
-        <pc:spChg chg="del mod">
-          <ac:chgData name="edlin guerra" userId="d52177a9150211f7" providerId="LiveId" clId="{1D5C1BF5-2544-4BBF-B69A-3DB33E7BAA21}" dt="2025-10-01T05:31:28.250" v="310" actId="478"/>
-          <ac:spMkLst>
-            <pc:docMk/>
-            <pc:sldMk cId="0" sldId="271"/>
-            <ac:spMk id="25605" creationId="{6773F73B-0288-18BE-3E4F-6BB2A50CD77D}"/>
-          </ac:spMkLst>
-        </pc:spChg>
         <pc:graphicFrameChg chg="mod">
           <ac:chgData name="edlin guerra" userId="d52177a9150211f7" providerId="LiveId" clId="{1D5C1BF5-2544-4BBF-B69A-3DB33E7BAA21}" dt="2025-10-01T05:31:40.906" v="314" actId="1076"/>
           <ac:graphicFrameMkLst>
@@ -489,14 +425,6 @@
           <pc:docMk/>
           <pc:sldMk cId="0" sldId="272"/>
         </pc:sldMkLst>
-        <pc:spChg chg="add del mod">
-          <ac:chgData name="edlin guerra" userId="d52177a9150211f7" providerId="LiveId" clId="{1D5C1BF5-2544-4BBF-B69A-3DB33E7BAA21}" dt="2025-10-01T05:41:30.698" v="391" actId="478"/>
-          <ac:spMkLst>
-            <pc:docMk/>
-            <pc:sldMk cId="0" sldId="272"/>
-            <ac:spMk id="2" creationId="{40799D50-8B74-E808-399D-68175EC73BB1}"/>
-          </ac:spMkLst>
-        </pc:spChg>
         <pc:spChg chg="mod">
           <ac:chgData name="edlin guerra" userId="d52177a9150211f7" providerId="LiveId" clId="{1D5C1BF5-2544-4BBF-B69A-3DB33E7BAA21}" dt="2025-10-01T04:59:55.214" v="270" actId="207"/>
           <ac:spMkLst>
@@ -513,14 +441,6 @@
             <ac:spMk id="5125" creationId="{24A96E04-C558-1328-1B08-8F6FB243C5C5}"/>
           </ac:spMkLst>
         </pc:spChg>
-        <pc:spChg chg="del mod">
-          <ac:chgData name="edlin guerra" userId="d52177a9150211f7" providerId="LiveId" clId="{1D5C1BF5-2544-4BBF-B69A-3DB33E7BAA21}" dt="2025-10-01T05:41:23.794" v="389" actId="478"/>
-          <ac:spMkLst>
-            <pc:docMk/>
-            <pc:sldMk cId="0" sldId="272"/>
-            <ac:spMk id="5126" creationId="{09214716-86A9-2BBC-4F8B-45170856A254}"/>
-          </ac:spMkLst>
-        </pc:spChg>
         <pc:spChg chg="mod">
           <ac:chgData name="edlin guerra" userId="d52177a9150211f7" providerId="LiveId" clId="{1D5C1BF5-2544-4BBF-B69A-3DB33E7BAA21}" dt="2025-10-01T05:41:37.905" v="392" actId="1076"/>
           <ac:spMkLst>
@@ -535,14 +455,6 @@
             <pc:docMk/>
             <pc:sldMk cId="0" sldId="272"/>
             <ac:spMk id="5128" creationId="{FE1AA6E8-A10A-31B5-48FD-0B354A208397}"/>
-          </ac:spMkLst>
-        </pc:spChg>
-        <pc:spChg chg="del mod">
-          <ac:chgData name="edlin guerra" userId="d52177a9150211f7" providerId="LiveId" clId="{1D5C1BF5-2544-4BBF-B69A-3DB33E7BAA21}" dt="2025-10-01T05:41:26.785" v="390" actId="478"/>
-          <ac:spMkLst>
-            <pc:docMk/>
-            <pc:sldMk cId="0" sldId="272"/>
-            <ac:spMk id="5129" creationId="{7F929134-3F7B-F4FF-D249-7E0953EFFDE7}"/>
           </ac:spMkLst>
         </pc:spChg>
         <pc:graphicFrameChg chg="mod">
@@ -568,36 +480,12 @@
           <pc:docMk/>
           <pc:sldMk cId="0" sldId="273"/>
         </pc:sldMkLst>
-        <pc:spChg chg="add del mod">
-          <ac:chgData name="edlin guerra" userId="d52177a9150211f7" providerId="LiveId" clId="{1D5C1BF5-2544-4BBF-B69A-3DB33E7BAA21}" dt="2025-10-01T05:42:17.752" v="395" actId="478"/>
-          <ac:spMkLst>
-            <pc:docMk/>
-            <pc:sldMk cId="0" sldId="273"/>
-            <ac:spMk id="2" creationId="{EE6317BE-559B-07A6-2368-3AC1026B0E87}"/>
-          </ac:spMkLst>
-        </pc:spChg>
         <pc:spChg chg="mod">
           <ac:chgData name="edlin guerra" userId="d52177a9150211f7" providerId="LiveId" clId="{1D5C1BF5-2544-4BBF-B69A-3DB33E7BAA21}" dt="2025-10-01T05:00:32.629" v="274" actId="207"/>
           <ac:spMkLst>
             <pc:docMk/>
             <pc:sldMk cId="0" sldId="273"/>
             <ac:spMk id="20482" creationId="{DAF9D18F-A5C1-D715-CF88-08DC93E98CCB}"/>
-          </ac:spMkLst>
-        </pc:spChg>
-        <pc:spChg chg="del mod">
-          <ac:chgData name="edlin guerra" userId="d52177a9150211f7" providerId="LiveId" clId="{1D5C1BF5-2544-4BBF-B69A-3DB33E7BAA21}" dt="2025-10-01T05:42:14.613" v="394" actId="478"/>
-          <ac:spMkLst>
-            <pc:docMk/>
-            <pc:sldMk cId="0" sldId="273"/>
-            <ac:spMk id="20483" creationId="{9A871E71-7A5F-A967-E717-799FB6585FC8}"/>
-          </ac:spMkLst>
-        </pc:spChg>
-        <pc:spChg chg="del mod">
-          <ac:chgData name="edlin guerra" userId="d52177a9150211f7" providerId="LiveId" clId="{1D5C1BF5-2544-4BBF-B69A-3DB33E7BAA21}" dt="2025-10-01T05:42:14.613" v="394" actId="478"/>
-          <ac:spMkLst>
-            <pc:docMk/>
-            <pc:sldMk cId="0" sldId="273"/>
-            <ac:spMk id="20484" creationId="{C142DC2A-E2AE-16E3-746C-122A4ADDF8BA}"/>
           </ac:spMkLst>
         </pc:spChg>
         <pc:spChg chg="mod">
@@ -709,14 +597,6 @@
           <pc:docMk/>
           <pc:sldMk cId="0" sldId="278"/>
         </pc:sldMkLst>
-        <pc:spChg chg="del">
-          <ac:chgData name="edlin guerra" userId="d52177a9150211f7" providerId="LiveId" clId="{1D5C1BF5-2544-4BBF-B69A-3DB33E7BAA21}" dt="2025-10-01T05:48:11.683" v="437" actId="478"/>
-          <ac:spMkLst>
-            <pc:docMk/>
-            <pc:sldMk cId="0" sldId="278"/>
-            <ac:spMk id="20484" creationId="{BE37E9C8-325A-4B15-9777-ABDF3CE1C33F}"/>
-          </ac:spMkLst>
-        </pc:spChg>
       </pc:sldChg>
       <pc:sldChg chg="addSp delSp modSp mod">
         <pc:chgData name="edlin guerra" userId="d52177a9150211f7" providerId="LiveId" clId="{1D5C1BF5-2544-4BBF-B69A-3DB33E7BAA21}" dt="2025-10-01T05:52:59.879" v="483" actId="14100"/>
@@ -725,22 +605,6 @@
           <pc:sldMk cId="0" sldId="279"/>
         </pc:sldMkLst>
         <pc:spChg chg="add del mod">
-          <ac:chgData name="edlin guerra" userId="d52177a9150211f7" providerId="LiveId" clId="{1D5C1BF5-2544-4BBF-B69A-3DB33E7BAA21}" dt="2025-10-01T05:50:30.377" v="444" actId="478"/>
-          <ac:spMkLst>
-            <pc:docMk/>
-            <pc:sldMk cId="0" sldId="279"/>
-            <ac:spMk id="2" creationId="{4EBC56C8-C917-921B-F2DC-8C464435A517}"/>
-          </ac:spMkLst>
-        </pc:spChg>
-        <pc:spChg chg="add del mod">
-          <ac:chgData name="edlin guerra" userId="d52177a9150211f7" providerId="LiveId" clId="{1D5C1BF5-2544-4BBF-B69A-3DB33E7BAA21}" dt="2025-10-01T05:50:30.377" v="444" actId="478"/>
-          <ac:spMkLst>
-            <pc:docMk/>
-            <pc:sldMk cId="0" sldId="279"/>
-            <ac:spMk id="3" creationId="{2D66F2B8-1AFD-6DF9-CECA-7623FF6418E4}"/>
-          </ac:spMkLst>
-        </pc:spChg>
-        <pc:spChg chg="add del mod">
           <ac:chgData name="edlin guerra" userId="d52177a9150211f7" providerId="LiveId" clId="{1D5C1BF5-2544-4BBF-B69A-3DB33E7BAA21}" dt="2025-10-01T05:52:59.879" v="483" actId="14100"/>
           <ac:spMkLst>
             <pc:docMk/>
@@ -748,78 +612,6 @@
             <ac:spMk id="4" creationId="{07457D51-0209-A6FC-2C00-7AB70C75511F}"/>
           </ac:spMkLst>
         </pc:spChg>
-        <pc:spChg chg="add del mod">
-          <ac:chgData name="edlin guerra" userId="d52177a9150211f7" providerId="LiveId" clId="{1D5C1BF5-2544-4BBF-B69A-3DB33E7BAA21}" dt="2025-10-01T05:50:30.377" v="444" actId="478"/>
-          <ac:spMkLst>
-            <pc:docMk/>
-            <pc:sldMk cId="0" sldId="279"/>
-            <ac:spMk id="5" creationId="{EB83CFD3-8AB0-CD24-2380-15BCC3AE8BDD}"/>
-          </ac:spMkLst>
-        </pc:spChg>
-        <pc:spChg chg="add del mod">
-          <ac:chgData name="edlin guerra" userId="d52177a9150211f7" providerId="LiveId" clId="{1D5C1BF5-2544-4BBF-B69A-3DB33E7BAA21}" dt="2025-10-01T05:50:30.377" v="444" actId="478"/>
-          <ac:spMkLst>
-            <pc:docMk/>
-            <pc:sldMk cId="0" sldId="279"/>
-            <ac:spMk id="6" creationId="{48342D8B-FE1D-BB25-61B7-9CBCC5C4A8A1}"/>
-          </ac:spMkLst>
-        </pc:spChg>
-        <pc:spChg chg="add del mod">
-          <ac:chgData name="edlin guerra" userId="d52177a9150211f7" providerId="LiveId" clId="{1D5C1BF5-2544-4BBF-B69A-3DB33E7BAA21}" dt="2025-10-01T05:51:43.889" v="472" actId="478"/>
-          <ac:spMkLst>
-            <pc:docMk/>
-            <pc:sldMk cId="0" sldId="279"/>
-            <ac:spMk id="7" creationId="{D21915E1-7B59-9F82-1DB5-41905028E807}"/>
-          </ac:spMkLst>
-        </pc:spChg>
-        <pc:spChg chg="del">
-          <ac:chgData name="edlin guerra" userId="d52177a9150211f7" providerId="LiveId" clId="{1D5C1BF5-2544-4BBF-B69A-3DB33E7BAA21}" dt="2025-10-01T05:51:40.778" v="471" actId="478"/>
-          <ac:spMkLst>
-            <pc:docMk/>
-            <pc:sldMk cId="0" sldId="279"/>
-            <ac:spMk id="8196" creationId="{6744D1D7-9A5C-4611-A5DF-2F0A170E969D}"/>
-          </ac:spMkLst>
-        </pc:spChg>
-        <pc:spChg chg="del">
-          <ac:chgData name="edlin guerra" userId="d52177a9150211f7" providerId="LiveId" clId="{1D5C1BF5-2544-4BBF-B69A-3DB33E7BAA21}" dt="2025-10-01T05:49:58.491" v="438" actId="478"/>
-          <ac:spMkLst>
-            <pc:docMk/>
-            <pc:sldMk cId="0" sldId="279"/>
-            <ac:spMk id="8197" creationId="{C07D3DA5-E6D0-4133-87A9-5134CA9131B0}"/>
-          </ac:spMkLst>
-        </pc:spChg>
-        <pc:spChg chg="del">
-          <ac:chgData name="edlin guerra" userId="d52177a9150211f7" providerId="LiveId" clId="{1D5C1BF5-2544-4BBF-B69A-3DB33E7BAA21}" dt="2025-10-01T05:49:58.491" v="438" actId="478"/>
-          <ac:spMkLst>
-            <pc:docMk/>
-            <pc:sldMk cId="0" sldId="279"/>
-            <ac:spMk id="8198" creationId="{8ED666CB-4F68-49D9-9B65-5666A6BDA49C}"/>
-          </ac:spMkLst>
-        </pc:spChg>
-        <pc:spChg chg="del">
-          <ac:chgData name="edlin guerra" userId="d52177a9150211f7" providerId="LiveId" clId="{1D5C1BF5-2544-4BBF-B69A-3DB33E7BAA21}" dt="2025-10-01T05:49:58.491" v="438" actId="478"/>
-          <ac:spMkLst>
-            <pc:docMk/>
-            <pc:sldMk cId="0" sldId="279"/>
-            <ac:spMk id="8199" creationId="{CEBDBF7A-A293-4D20-85D8-2D849D6369B5}"/>
-          </ac:spMkLst>
-        </pc:spChg>
-        <pc:spChg chg="del">
-          <ac:chgData name="edlin guerra" userId="d52177a9150211f7" providerId="LiveId" clId="{1D5C1BF5-2544-4BBF-B69A-3DB33E7BAA21}" dt="2025-10-01T05:49:58.491" v="438" actId="478"/>
-          <ac:spMkLst>
-            <pc:docMk/>
-            <pc:sldMk cId="0" sldId="279"/>
-            <ac:spMk id="8200" creationId="{7F2D78C7-2D76-4E16-9993-3A8D9331CDEB}"/>
-          </ac:spMkLst>
-        </pc:spChg>
-        <pc:graphicFrameChg chg="del">
-          <ac:chgData name="edlin guerra" userId="d52177a9150211f7" providerId="LiveId" clId="{1D5C1BF5-2544-4BBF-B69A-3DB33E7BAA21}" dt="2025-10-01T05:49:58.491" v="438" actId="478"/>
-          <ac:graphicFrameMkLst>
-            <pc:docMk/>
-            <pc:sldMk cId="0" sldId="279"/>
-            <ac:graphicFrameMk id="8194" creationId="{9487890A-220D-4810-8B71-98EB7480C23E}"/>
-          </ac:graphicFrameMkLst>
-        </pc:graphicFrameChg>
       </pc:sldChg>
       <pc:sldChg chg="del">
         <pc:chgData name="edlin guerra" userId="d52177a9150211f7" providerId="LiveId" clId="{1D5C1BF5-2544-4BBF-B69A-3DB33E7BAA21}" dt="2025-10-01T05:57:03.087" v="534" actId="47"/>
@@ -841,22 +633,6 @@
           <pc:docMk/>
           <pc:sldMk cId="0" sldId="288"/>
         </pc:sldMkLst>
-        <pc:picChg chg="mod">
-          <ac:chgData name="edlin guerra" userId="d52177a9150211f7" providerId="LiveId" clId="{1D5C1BF5-2544-4BBF-B69A-3DB33E7BAA21}" dt="2025-10-01T05:03:16.498" v="299" actId="14100"/>
-          <ac:picMkLst>
-            <pc:docMk/>
-            <pc:sldMk cId="0" sldId="288"/>
-            <ac:picMk id="21506" creationId="{C01D10DB-BCBA-871F-29EA-7A412632DB9E}"/>
-          </ac:picMkLst>
-        </pc:picChg>
-        <pc:picChg chg="del">
-          <ac:chgData name="edlin guerra" userId="d52177a9150211f7" providerId="LiveId" clId="{1D5C1BF5-2544-4BBF-B69A-3DB33E7BAA21}" dt="2025-10-01T05:03:08.540" v="298" actId="478"/>
-          <ac:picMkLst>
-            <pc:docMk/>
-            <pc:sldMk cId="0" sldId="288"/>
-            <ac:picMk id="21507" creationId="{2A0A3273-6017-5FB2-59FF-AC9049C85638}"/>
-          </ac:picMkLst>
-        </pc:picChg>
       </pc:sldChg>
       <pc:sldChg chg="modSp mod">
         <pc:chgData name="edlin guerra" userId="d52177a9150211f7" providerId="LiveId" clId="{1D5C1BF5-2544-4BBF-B69A-3DB33E7BAA21}" dt="2025-10-01T14:09:36.598" v="549" actId="1076"/>
@@ -879,22 +655,6 @@
           <pc:docMk/>
           <pc:sldMk cId="4204934383" sldId="294"/>
         </pc:sldMkLst>
-        <pc:spChg chg="add del mod">
-          <ac:chgData name="edlin guerra" userId="d52177a9150211f7" providerId="LiveId" clId="{1D5C1BF5-2544-4BBF-B69A-3DB33E7BAA21}" dt="2025-10-01T04:39:12.826" v="187" actId="478"/>
-          <ac:spMkLst>
-            <pc:docMk/>
-            <pc:sldMk cId="4204934383" sldId="294"/>
-            <ac:spMk id="3" creationId="{61A5312F-BAE7-67A8-734C-7D34D0F7820C}"/>
-          </ac:spMkLst>
-        </pc:spChg>
-        <pc:spChg chg="del">
-          <ac:chgData name="edlin guerra" userId="d52177a9150211f7" providerId="LiveId" clId="{1D5C1BF5-2544-4BBF-B69A-3DB33E7BAA21}" dt="2025-10-01T04:16:24.040" v="118" actId="478"/>
-          <ac:spMkLst>
-            <pc:docMk/>
-            <pc:sldMk cId="4204934383" sldId="294"/>
-            <ac:spMk id="7173" creationId="{F9C8C34C-45DE-F29D-05D5-0CC91EB822F6}"/>
-          </ac:spMkLst>
-        </pc:spChg>
         <pc:spChg chg="mod">
           <ac:chgData name="edlin guerra" userId="d52177a9150211f7" providerId="LiveId" clId="{1D5C1BF5-2544-4BBF-B69A-3DB33E7BAA21}" dt="2025-10-01T04:16:49.655" v="144" actId="14100"/>
           <ac:spMkLst>
@@ -919,14 +679,6 @@
             <ac:graphicFrameMk id="5" creationId="{33D6AAEE-48DB-09AF-65B5-033E66EF4F33}"/>
           </ac:graphicFrameMkLst>
         </pc:graphicFrameChg>
-        <pc:picChg chg="add del mod">
-          <ac:chgData name="edlin guerra" userId="d52177a9150211f7" providerId="LiveId" clId="{1D5C1BF5-2544-4BBF-B69A-3DB33E7BAA21}" dt="2025-10-01T04:39:04.797" v="185" actId="478"/>
-          <ac:picMkLst>
-            <pc:docMk/>
-            <pc:sldMk cId="4204934383" sldId="294"/>
-            <ac:picMk id="2" creationId="{168E24B4-3938-4EF6-D076-40FE817F2DE2}"/>
-          </ac:picMkLst>
-        </pc:picChg>
         <pc:picChg chg="add mod">
           <ac:chgData name="edlin guerra" userId="d52177a9150211f7" providerId="LiveId" clId="{1D5C1BF5-2544-4BBF-B69A-3DB33E7BAA21}" dt="2025-10-01T04:39:20.651" v="190" actId="1076"/>
           <ac:picMkLst>
@@ -1060,62 +812,6 @@
           <pc:docMk/>
           <pc:sldMk cId="0" sldId="297"/>
         </pc:sldMkLst>
-        <pc:spChg chg="add del mod">
-          <ac:chgData name="edlin guerra" userId="d52177a9150211f7" providerId="LiveId" clId="{1D5C1BF5-2544-4BBF-B69A-3DB33E7BAA21}" dt="2025-10-01T05:31:58.674" v="317" actId="478"/>
-          <ac:spMkLst>
-            <pc:docMk/>
-            <pc:sldMk cId="0" sldId="297"/>
-            <ac:spMk id="2" creationId="{D2A1C279-DB97-C22E-ADAE-C7CA99215208}"/>
-          </ac:spMkLst>
-        </pc:spChg>
-        <pc:spChg chg="mod">
-          <ac:chgData name="edlin guerra" userId="d52177a9150211f7" providerId="LiveId" clId="{1D5C1BF5-2544-4BBF-B69A-3DB33E7BAA21}" dt="2025-10-01T04:51:08.317" v="217" actId="404"/>
-          <ac:spMkLst>
-            <pc:docMk/>
-            <pc:sldMk cId="0" sldId="297"/>
-            <ac:spMk id="19458" creationId="{E79816D7-3A60-FDD8-AB64-419CBCF58463}"/>
-          </ac:spMkLst>
-        </pc:spChg>
-        <pc:spChg chg="del mod">
-          <ac:chgData name="edlin guerra" userId="d52177a9150211f7" providerId="LiveId" clId="{1D5C1BF5-2544-4BBF-B69A-3DB33E7BAA21}" dt="2025-10-01T05:31:55.886" v="316" actId="478"/>
-          <ac:spMkLst>
-            <pc:docMk/>
-            <pc:sldMk cId="0" sldId="297"/>
-            <ac:spMk id="19459" creationId="{EF0279F4-1C93-3076-E55E-AE08C59D30E3}"/>
-          </ac:spMkLst>
-        </pc:spChg>
-        <pc:spChg chg="mod">
-          <ac:chgData name="edlin guerra" userId="d52177a9150211f7" providerId="LiveId" clId="{1D5C1BF5-2544-4BBF-B69A-3DB33E7BAA21}" dt="2025-10-01T05:32:11.305" v="318" actId="1076"/>
-          <ac:spMkLst>
-            <pc:docMk/>
-            <pc:sldMk cId="0" sldId="297"/>
-            <ac:spMk id="19461" creationId="{8394B6CB-FA0F-ABA1-94FF-E02517C3D599}"/>
-          </ac:spMkLst>
-        </pc:spChg>
-        <pc:spChg chg="del mod">
-          <ac:chgData name="edlin guerra" userId="d52177a9150211f7" providerId="LiveId" clId="{1D5C1BF5-2544-4BBF-B69A-3DB33E7BAA21}" dt="2025-10-01T05:31:50.488" v="315" actId="478"/>
-          <ac:spMkLst>
-            <pc:docMk/>
-            <pc:sldMk cId="0" sldId="297"/>
-            <ac:spMk id="40965" creationId="{400C2A88-EC3E-376C-B218-21A6F43018EC}"/>
-          </ac:spMkLst>
-        </pc:spChg>
-        <pc:graphicFrameChg chg="del mod">
-          <ac:chgData name="edlin guerra" userId="d52177a9150211f7" providerId="LiveId" clId="{1D5C1BF5-2544-4BBF-B69A-3DB33E7BAA21}" dt="2025-10-01T05:32:34.562" v="321" actId="21"/>
-          <ac:graphicFrameMkLst>
-            <pc:docMk/>
-            <pc:sldMk cId="0" sldId="297"/>
-            <ac:graphicFrameMk id="9" creationId="{32DB9EAB-A31F-5277-90E5-C01D583EAD73}"/>
-          </ac:graphicFrameMkLst>
-        </pc:graphicFrameChg>
-        <pc:graphicFrameChg chg="del mod">
-          <ac:chgData name="edlin guerra" userId="d52177a9150211f7" providerId="LiveId" clId="{1D5C1BF5-2544-4BBF-B69A-3DB33E7BAA21}" dt="2025-10-01T05:32:34.562" v="321" actId="21"/>
-          <ac:graphicFrameMkLst>
-            <pc:docMk/>
-            <pc:sldMk cId="0" sldId="297"/>
-            <ac:graphicFrameMk id="10" creationId="{8C987065-FC70-F2FF-13E4-79328A1ED066}"/>
-          </ac:graphicFrameMkLst>
-        </pc:graphicFrameChg>
       </pc:sldChg>
       <pc:sldChg chg="addSp delSp modSp new mod">
         <pc:chgData name="edlin guerra" userId="d52177a9150211f7" providerId="LiveId" clId="{1D5C1BF5-2544-4BBF-B69A-3DB33E7BAA21}" dt="2025-10-01T05:47:18.347" v="436" actId="1076"/>
@@ -1123,164 +819,12 @@
           <pc:docMk/>
           <pc:sldMk cId="174915873" sldId="298"/>
         </pc:sldMkLst>
-        <pc:spChg chg="del">
-          <ac:chgData name="edlin guerra" userId="d52177a9150211f7" providerId="LiveId" clId="{1D5C1BF5-2544-4BBF-B69A-3DB33E7BAA21}" dt="2025-10-01T05:30:44.440" v="307" actId="478"/>
-          <ac:spMkLst>
-            <pc:docMk/>
-            <pc:sldMk cId="174915873" sldId="298"/>
-            <ac:spMk id="2" creationId="{1043E09B-DDD9-6E1A-CB23-268A67C0B974}"/>
-          </ac:spMkLst>
-        </pc:spChg>
-        <pc:spChg chg="del">
-          <ac:chgData name="edlin guerra" userId="d52177a9150211f7" providerId="LiveId" clId="{1D5C1BF5-2544-4BBF-B69A-3DB33E7BAA21}" dt="2025-10-01T05:30:44.440" v="307" actId="478"/>
-          <ac:spMkLst>
-            <pc:docMk/>
-            <pc:sldMk cId="174915873" sldId="298"/>
-            <ac:spMk id="3" creationId="{C650F118-EA82-0783-1669-CDADC2E47695}"/>
-          </ac:spMkLst>
-        </pc:spChg>
-        <pc:spChg chg="del">
-          <ac:chgData name="edlin guerra" userId="d52177a9150211f7" providerId="LiveId" clId="{1D5C1BF5-2544-4BBF-B69A-3DB33E7BAA21}" dt="2025-10-01T05:30:44.440" v="307" actId="478"/>
-          <ac:spMkLst>
-            <pc:docMk/>
-            <pc:sldMk cId="174915873" sldId="298"/>
-            <ac:spMk id="4" creationId="{2D4D3E06-83A7-34B0-508F-FE3F8EDA7690}"/>
-          </ac:spMkLst>
-        </pc:spChg>
-        <pc:spChg chg="del">
-          <ac:chgData name="edlin guerra" userId="d52177a9150211f7" providerId="LiveId" clId="{1D5C1BF5-2544-4BBF-B69A-3DB33E7BAA21}" dt="2025-10-01T05:30:44.440" v="307" actId="478"/>
-          <ac:spMkLst>
-            <pc:docMk/>
-            <pc:sldMk cId="174915873" sldId="298"/>
-            <ac:spMk id="5" creationId="{74789AAE-CDF7-1384-01BE-E71DD1B76861}"/>
-          </ac:spMkLst>
-        </pc:spChg>
-        <pc:spChg chg="add">
-          <ac:chgData name="edlin guerra" userId="d52177a9150211f7" providerId="LiveId" clId="{1D5C1BF5-2544-4BBF-B69A-3DB33E7BAA21}" dt="2025-10-01T05:43:07.367" v="404"/>
-          <ac:spMkLst>
-            <pc:docMk/>
-            <pc:sldMk cId="174915873" sldId="298"/>
-            <ac:spMk id="8" creationId="{003A2B0B-A4C4-04F5-4883-CC0CDEA9C2AD}"/>
-          </ac:spMkLst>
-        </pc:spChg>
-        <pc:spChg chg="add">
-          <ac:chgData name="edlin guerra" userId="d52177a9150211f7" providerId="LiveId" clId="{1D5C1BF5-2544-4BBF-B69A-3DB33E7BAA21}" dt="2025-10-01T05:43:07.367" v="404"/>
-          <ac:spMkLst>
-            <pc:docMk/>
-            <pc:sldMk cId="174915873" sldId="298"/>
-            <ac:spMk id="9" creationId="{3DE70353-0E24-2379-542B-7759BA607D4D}"/>
-          </ac:spMkLst>
-        </pc:spChg>
-        <pc:spChg chg="add">
-          <ac:chgData name="edlin guerra" userId="d52177a9150211f7" providerId="LiveId" clId="{1D5C1BF5-2544-4BBF-B69A-3DB33E7BAA21}" dt="2025-10-01T05:43:07.367" v="404"/>
-          <ac:spMkLst>
-            <pc:docMk/>
-            <pc:sldMk cId="174915873" sldId="298"/>
-            <ac:spMk id="10" creationId="{16AE7560-742E-C95B-027B-B10112CCF8A4}"/>
-          </ac:spMkLst>
-        </pc:spChg>
-        <pc:spChg chg="add">
-          <ac:chgData name="edlin guerra" userId="d52177a9150211f7" providerId="LiveId" clId="{1D5C1BF5-2544-4BBF-B69A-3DB33E7BAA21}" dt="2025-10-01T05:43:07.367" v="404"/>
-          <ac:spMkLst>
-            <pc:docMk/>
-            <pc:sldMk cId="174915873" sldId="298"/>
-            <ac:spMk id="11" creationId="{923A59DE-C644-78CE-8670-058599CBA814}"/>
-          </ac:spMkLst>
-        </pc:spChg>
-        <pc:spChg chg="add">
-          <ac:chgData name="edlin guerra" userId="d52177a9150211f7" providerId="LiveId" clId="{1D5C1BF5-2544-4BBF-B69A-3DB33E7BAA21}" dt="2025-10-01T05:43:07.367" v="404"/>
-          <ac:spMkLst>
-            <pc:docMk/>
-            <pc:sldMk cId="174915873" sldId="298"/>
-            <ac:spMk id="12" creationId="{3B93DC90-D13E-BBB6-5FDD-17E34BA91D19}"/>
-          </ac:spMkLst>
-        </pc:spChg>
-        <pc:spChg chg="add del mod">
-          <ac:chgData name="edlin guerra" userId="d52177a9150211f7" providerId="LiveId" clId="{1D5C1BF5-2544-4BBF-B69A-3DB33E7BAA21}" dt="2025-10-01T05:43:56.219" v="408"/>
-          <ac:spMkLst>
-            <pc:docMk/>
-            <pc:sldMk cId="174915873" sldId="298"/>
-            <ac:spMk id="13" creationId="{88E22AD8-AE37-088E-D123-C7EBB1ADAFA6}"/>
-          </ac:spMkLst>
-        </pc:spChg>
-        <pc:spChg chg="add">
-          <ac:chgData name="edlin guerra" userId="d52177a9150211f7" providerId="LiveId" clId="{1D5C1BF5-2544-4BBF-B69A-3DB33E7BAA21}" dt="2025-10-01T05:43:32.928" v="406"/>
-          <ac:spMkLst>
-            <pc:docMk/>
-            <pc:sldMk cId="174915873" sldId="298"/>
-            <ac:spMk id="14" creationId="{696107FB-E73C-3541-06F6-2774C9CA40FD}"/>
-          </ac:spMkLst>
-        </pc:spChg>
-        <pc:spChg chg="add">
-          <ac:chgData name="edlin guerra" userId="d52177a9150211f7" providerId="LiveId" clId="{1D5C1BF5-2544-4BBF-B69A-3DB33E7BAA21}" dt="2025-10-01T05:43:32.928" v="406"/>
-          <ac:spMkLst>
-            <pc:docMk/>
-            <pc:sldMk cId="174915873" sldId="298"/>
-            <ac:spMk id="15" creationId="{1F92D733-7F89-53A7-9C40-1229B5667BF5}"/>
-          </ac:spMkLst>
-        </pc:spChg>
-        <pc:spChg chg="add">
-          <ac:chgData name="edlin guerra" userId="d52177a9150211f7" providerId="LiveId" clId="{1D5C1BF5-2544-4BBF-B69A-3DB33E7BAA21}" dt="2025-10-01T05:43:32.928" v="406"/>
-          <ac:spMkLst>
-            <pc:docMk/>
-            <pc:sldMk cId="174915873" sldId="298"/>
-            <ac:spMk id="16" creationId="{FA4B2777-3E98-420B-8681-F05FC224D4E7}"/>
-          </ac:spMkLst>
-        </pc:spChg>
-        <pc:spChg chg="add">
-          <ac:chgData name="edlin guerra" userId="d52177a9150211f7" providerId="LiveId" clId="{1D5C1BF5-2544-4BBF-B69A-3DB33E7BAA21}" dt="2025-10-01T05:43:32.928" v="406"/>
-          <ac:spMkLst>
-            <pc:docMk/>
-            <pc:sldMk cId="174915873" sldId="298"/>
-            <ac:spMk id="17" creationId="{131D23E4-9DB7-D376-DFFC-AE0910BA425D}"/>
-          </ac:spMkLst>
-        </pc:spChg>
-        <pc:spChg chg="add">
-          <ac:chgData name="edlin guerra" userId="d52177a9150211f7" providerId="LiveId" clId="{1D5C1BF5-2544-4BBF-B69A-3DB33E7BAA21}" dt="2025-10-01T05:43:32.928" v="406"/>
-          <ac:spMkLst>
-            <pc:docMk/>
-            <pc:sldMk cId="174915873" sldId="298"/>
-            <ac:spMk id="18" creationId="{1EC1B12A-1EC4-53AC-A0D2-1D3DA34D1FBB}"/>
-          </ac:spMkLst>
-        </pc:spChg>
-        <pc:spChg chg="add del">
-          <ac:chgData name="edlin guerra" userId="d52177a9150211f7" providerId="LiveId" clId="{1D5C1BF5-2544-4BBF-B69A-3DB33E7BAA21}" dt="2025-10-01T05:44:24.533" v="412" actId="478"/>
-          <ac:spMkLst>
-            <pc:docMk/>
-            <pc:sldMk cId="174915873" sldId="298"/>
-            <ac:spMk id="19" creationId="{31C025E3-A7B8-CBBE-C01B-6D1EDF2CB96C}"/>
-          </ac:spMkLst>
-        </pc:spChg>
-        <pc:spChg chg="add del">
-          <ac:chgData name="edlin guerra" userId="d52177a9150211f7" providerId="LiveId" clId="{1D5C1BF5-2544-4BBF-B69A-3DB33E7BAA21}" dt="2025-10-01T05:44:19.529" v="411" actId="478"/>
-          <ac:spMkLst>
-            <pc:docMk/>
-            <pc:sldMk cId="174915873" sldId="298"/>
-            <ac:spMk id="20" creationId="{C86FD7E0-E06C-059A-0D31-4D14533D8A1E}"/>
-          </ac:spMkLst>
-        </pc:spChg>
         <pc:spChg chg="add mod">
           <ac:chgData name="edlin guerra" userId="d52177a9150211f7" providerId="LiveId" clId="{1D5C1BF5-2544-4BBF-B69A-3DB33E7BAA21}" dt="2025-10-01T05:47:14.030" v="435" actId="1076"/>
           <ac:spMkLst>
             <pc:docMk/>
             <pc:sldMk cId="174915873" sldId="298"/>
             <ac:spMk id="21" creationId="{21A08E5C-8315-0F89-38C1-029580C962A1}"/>
-          </ac:spMkLst>
-        </pc:spChg>
-        <pc:spChg chg="add del">
-          <ac:chgData name="edlin guerra" userId="d52177a9150211f7" providerId="LiveId" clId="{1D5C1BF5-2544-4BBF-B69A-3DB33E7BAA21}" dt="2025-10-01T05:44:24.533" v="412" actId="478"/>
-          <ac:spMkLst>
-            <pc:docMk/>
-            <pc:sldMk cId="174915873" sldId="298"/>
-            <ac:spMk id="22" creationId="{194D81C8-14C0-540A-4F91-A148F5FF7B49}"/>
-          </ac:spMkLst>
-        </pc:spChg>
-        <pc:spChg chg="add del">
-          <ac:chgData name="edlin guerra" userId="d52177a9150211f7" providerId="LiveId" clId="{1D5C1BF5-2544-4BBF-B69A-3DB33E7BAA21}" dt="2025-10-01T05:44:24.533" v="412" actId="478"/>
-          <ac:spMkLst>
-            <pc:docMk/>
-            <pc:sldMk cId="174915873" sldId="298"/>
-            <ac:spMk id="23" creationId="{73C7F73F-7112-60B7-7745-EDE426F85116}"/>
           </ac:spMkLst>
         </pc:spChg>
         <pc:spChg chg="add mod">
@@ -1291,14 +835,6 @@
             <ac:spMk id="24" creationId="{DF26EA29-D001-0CEC-4790-E97ED771EA9C}"/>
           </ac:spMkLst>
         </pc:spChg>
-        <pc:picChg chg="add del">
-          <ac:chgData name="edlin guerra" userId="d52177a9150211f7" providerId="LiveId" clId="{1D5C1BF5-2544-4BBF-B69A-3DB33E7BAA21}" dt="2025-10-01T05:30:51.351" v="309" actId="478"/>
-          <ac:picMkLst>
-            <pc:docMk/>
-            <pc:sldMk cId="174915873" sldId="298"/>
-            <ac:picMk id="7" creationId="{6A5451DE-1C7A-8233-12D8-4B7FA7F26E5A}"/>
-          </ac:picMkLst>
-        </pc:picChg>
         <pc:picChg chg="add mod">
           <ac:chgData name="edlin guerra" userId="d52177a9150211f7" providerId="LiveId" clId="{1D5C1BF5-2544-4BBF-B69A-3DB33E7BAA21}" dt="2025-10-01T05:47:18.347" v="436" actId="1076"/>
           <ac:picMkLst>
@@ -1314,44 +850,12 @@
           <pc:docMk/>
           <pc:sldMk cId="3332856273" sldId="299"/>
         </pc:sldMkLst>
-        <pc:spChg chg="add del mod">
-          <ac:chgData name="edlin guerra" userId="d52177a9150211f7" providerId="LiveId" clId="{1D5C1BF5-2544-4BBF-B69A-3DB33E7BAA21}" dt="2025-10-01T05:34:27.938" v="331" actId="478"/>
-          <ac:spMkLst>
-            <pc:docMk/>
-            <pc:sldMk cId="3332856273" sldId="299"/>
-            <ac:spMk id="3" creationId="{760479D7-AE28-2C8B-A541-766E53FC4B88}"/>
-          </ac:spMkLst>
-        </pc:spChg>
         <pc:spChg chg="add mod">
           <ac:chgData name="edlin guerra" userId="d52177a9150211f7" providerId="LiveId" clId="{1D5C1BF5-2544-4BBF-B69A-3DB33E7BAA21}" dt="2025-10-01T05:38:19.621" v="368" actId="404"/>
           <ac:spMkLst>
             <pc:docMk/>
             <pc:sldMk cId="3332856273" sldId="299"/>
             <ac:spMk id="4" creationId="{4F878789-8126-B595-7B28-9C2E05528672}"/>
-          </ac:spMkLst>
-        </pc:spChg>
-        <pc:spChg chg="del">
-          <ac:chgData name="edlin guerra" userId="d52177a9150211f7" providerId="LiveId" clId="{1D5C1BF5-2544-4BBF-B69A-3DB33E7BAA21}" dt="2025-10-01T05:32:24.192" v="320" actId="478"/>
-          <ac:spMkLst>
-            <pc:docMk/>
-            <pc:sldMk cId="3332856273" sldId="299"/>
-            <ac:spMk id="9" creationId="{72EBDBE9-CF76-5786-3C06-0D900B1DE2EC}"/>
-          </ac:spMkLst>
-        </pc:spChg>
-        <pc:spChg chg="del">
-          <ac:chgData name="edlin guerra" userId="d52177a9150211f7" providerId="LiveId" clId="{1D5C1BF5-2544-4BBF-B69A-3DB33E7BAA21}" dt="2025-10-01T05:32:24.192" v="320" actId="478"/>
-          <ac:spMkLst>
-            <pc:docMk/>
-            <pc:sldMk cId="3332856273" sldId="299"/>
-            <ac:spMk id="4105" creationId="{34CA9233-2340-51AF-7C5B-D7AADA72F916}"/>
-          </ac:spMkLst>
-        </pc:spChg>
-        <pc:spChg chg="del">
-          <ac:chgData name="edlin guerra" userId="d52177a9150211f7" providerId="LiveId" clId="{1D5C1BF5-2544-4BBF-B69A-3DB33E7BAA21}" dt="2025-10-01T05:32:24.192" v="320" actId="478"/>
-          <ac:spMkLst>
-            <pc:docMk/>
-            <pc:sldMk cId="3332856273" sldId="299"/>
-            <ac:spMk id="4106" creationId="{E7ABE571-59F9-B92E-ACE6-3628CE48E177}"/>
           </ac:spMkLst>
         </pc:spChg>
         <pc:graphicFrameChg chg="add mod">
@@ -1370,29 +874,21 @@
             <ac:graphicFrameMk id="10" creationId="{8C987065-FC70-F2FF-13E4-79328A1ED066}"/>
           </ac:graphicFrameMkLst>
         </pc:graphicFrameChg>
-        <pc:graphicFrameChg chg="del">
-          <ac:chgData name="edlin guerra" userId="d52177a9150211f7" providerId="LiveId" clId="{1D5C1BF5-2544-4BBF-B69A-3DB33E7BAA21}" dt="2025-10-01T05:32:24.192" v="320" actId="478"/>
-          <ac:graphicFrameMkLst>
-            <pc:docMk/>
-            <pc:sldMk cId="3332856273" sldId="299"/>
-            <ac:graphicFrameMk id="4098" creationId="{A4D5703E-C900-3226-4EE9-3E8F637877F3}"/>
-          </ac:graphicFrameMkLst>
-        </pc:graphicFrameChg>
-        <pc:picChg chg="del">
-          <ac:chgData name="edlin guerra" userId="d52177a9150211f7" providerId="LiveId" clId="{1D5C1BF5-2544-4BBF-B69A-3DB33E7BAA21}" dt="2025-10-01T05:32:24.192" v="320" actId="478"/>
-          <ac:picMkLst>
-            <pc:docMk/>
-            <pc:sldMk cId="3332856273" sldId="299"/>
-            <ac:picMk id="4103" creationId="{5FB0DD61-0085-2B29-DECA-56C1A8C88829}"/>
-          </ac:picMkLst>
-        </pc:picChg>
       </pc:sldChg>
-      <pc:sldChg chg="add">
-        <pc:chgData name="edlin guerra" userId="d52177a9150211f7" providerId="LiveId" clId="{1D5C1BF5-2544-4BBF-B69A-3DB33E7BAA21}" dt="2025-10-01T15:46:01.532" v="550"/>
+      <pc:sldChg chg="modSp add mod">
+        <pc:chgData name="edlin guerra" userId="d52177a9150211f7" providerId="LiveId" clId="{1D5C1BF5-2544-4BBF-B69A-3DB33E7BAA21}" dt="2025-10-07T15:54:31.425" v="553" actId="20577"/>
         <pc:sldMkLst>
           <pc:docMk/>
           <pc:sldMk cId="0" sldId="300"/>
         </pc:sldMkLst>
+        <pc:spChg chg="mod">
+          <ac:chgData name="edlin guerra" userId="d52177a9150211f7" providerId="LiveId" clId="{1D5C1BF5-2544-4BBF-B69A-3DB33E7BAA21}" dt="2025-10-07T15:54:31.425" v="553" actId="20577"/>
+          <ac:spMkLst>
+            <pc:docMk/>
+            <pc:sldMk cId="0" sldId="300"/>
+            <ac:spMk id="8198" creationId="{8ED666CB-4F68-49D9-9B65-5666A6BDA49C}"/>
+          </ac:spMkLst>
+        </pc:spChg>
       </pc:sldChg>
     </pc:docChg>
   </pc:docChgLst>
@@ -7705,7 +7201,7 @@
               <a:pPr>
                 <a:defRPr/>
               </a:pPr>
-              <a:t>30/9/2025</a:t>
+              <a:t>7/10/2025</a:t>
             </a:fld>
             <a:endParaRPr lang="es-VE"/>
           </a:p>
@@ -7931,7 +7427,7 @@
               <a:pPr>
                 <a:defRPr/>
               </a:pPr>
-              <a:t>30/9/2025</a:t>
+              <a:t>7/10/2025</a:t>
             </a:fld>
             <a:endParaRPr lang="es-VE"/>
           </a:p>
@@ -9988,7 +9484,7 @@
           <a:p>
             <a:fld id="{7F375D67-520A-4DD7-BB02-9E954CF56F04}" type="datetimeFigureOut">
               <a:rPr lang="es-MX" smtClean="0"/>
-              <a:t>30/09/2025</a:t>
+              <a:t>07/10/2025</a:t>
             </a:fld>
             <a:endParaRPr lang="es-MX"/>
           </a:p>
@@ -10158,7 +9654,7 @@
           <a:p>
             <a:fld id="{7F375D67-520A-4DD7-BB02-9E954CF56F04}" type="datetimeFigureOut">
               <a:rPr lang="es-MX" smtClean="0"/>
-              <a:t>30/09/2025</a:t>
+              <a:t>07/10/2025</a:t>
             </a:fld>
             <a:endParaRPr lang="es-MX"/>
           </a:p>
@@ -10402,7 +9898,7 @@
           <a:p>
             <a:fld id="{7F375D67-520A-4DD7-BB02-9E954CF56F04}" type="datetimeFigureOut">
               <a:rPr lang="es-MX" smtClean="0"/>
-              <a:t>30/09/2025</a:t>
+              <a:t>07/10/2025</a:t>
             </a:fld>
             <a:endParaRPr lang="es-MX"/>
           </a:p>
@@ -10634,7 +10130,7 @@
           <a:p>
             <a:fld id="{7F375D67-520A-4DD7-BB02-9E954CF56F04}" type="datetimeFigureOut">
               <a:rPr lang="es-MX" smtClean="0"/>
-              <a:t>30/09/2025</a:t>
+              <a:t>07/10/2025</a:t>
             </a:fld>
             <a:endParaRPr lang="es-MX"/>
           </a:p>
@@ -11001,7 +10497,7 @@
           <a:p>
             <a:fld id="{7F375D67-520A-4DD7-BB02-9E954CF56F04}" type="datetimeFigureOut">
               <a:rPr lang="es-MX" smtClean="0"/>
-              <a:t>30/09/2025</a:t>
+              <a:t>07/10/2025</a:t>
             </a:fld>
             <a:endParaRPr lang="es-MX"/>
           </a:p>
@@ -11328,7 +10824,7 @@
           <a:p>
             <a:fld id="{7F375D67-520A-4DD7-BB02-9E954CF56F04}" type="datetimeFigureOut">
               <a:rPr lang="es-MX" smtClean="0"/>
-              <a:t>30/09/2025</a:t>
+              <a:t>07/10/2025</a:t>
             </a:fld>
             <a:endParaRPr lang="es-MX"/>
           </a:p>
@@ -11423,7 +10919,7 @@
           <a:p>
             <a:fld id="{7F375D67-520A-4DD7-BB02-9E954CF56F04}" type="datetimeFigureOut">
               <a:rPr lang="es-MX" smtClean="0"/>
-              <a:t>30/09/2025</a:t>
+              <a:t>07/10/2025</a:t>
             </a:fld>
             <a:endParaRPr lang="es-MX"/>
           </a:p>
@@ -11700,7 +11196,7 @@
           <a:p>
             <a:fld id="{7F375D67-520A-4DD7-BB02-9E954CF56F04}" type="datetimeFigureOut">
               <a:rPr lang="es-MX" smtClean="0"/>
-              <a:t>30/09/2025</a:t>
+              <a:t>07/10/2025</a:t>
             </a:fld>
             <a:endParaRPr lang="es-MX"/>
           </a:p>
@@ -11957,7 +11453,7 @@
           <a:p>
             <a:fld id="{7F375D67-520A-4DD7-BB02-9E954CF56F04}" type="datetimeFigureOut">
               <a:rPr lang="es-MX" smtClean="0"/>
-              <a:t>30/09/2025</a:t>
+              <a:t>07/10/2025</a:t>
             </a:fld>
             <a:endParaRPr lang="es-MX"/>
           </a:p>
@@ -12127,7 +11623,7 @@
           <a:p>
             <a:fld id="{7F375D67-520A-4DD7-BB02-9E954CF56F04}" type="datetimeFigureOut">
               <a:rPr lang="es-MX" smtClean="0"/>
-              <a:t>30/09/2025</a:t>
+              <a:t>07/10/2025</a:t>
             </a:fld>
             <a:endParaRPr lang="es-MX"/>
           </a:p>
@@ -12307,7 +11803,7 @@
           <a:p>
             <a:fld id="{7F375D67-520A-4DD7-BB02-9E954CF56F04}" type="datetimeFigureOut">
               <a:rPr lang="es-MX" smtClean="0"/>
-              <a:t>30/09/2025</a:t>
+              <a:t>07/10/2025</a:t>
             </a:fld>
             <a:endParaRPr lang="es-MX"/>
           </a:p>
@@ -15191,7 +14687,7 @@
           <a:p>
             <a:fld id="{7F375D67-520A-4DD7-BB02-9E954CF56F04}" type="datetimeFigureOut">
               <a:rPr lang="es-MX" smtClean="0"/>
-              <a:t>30/09/2025</a:t>
+              <a:t>07/10/2025</a:t>
             </a:fld>
             <a:endParaRPr lang="es-MX"/>
           </a:p>
@@ -17251,7 +16747,7 @@
             </a:extLst>
           </p:cNvPr>
           <p:cNvGraphicFramePr>
-            <a:graphicFrameLocks noChangeAspect="1"/>
+            <a:graphicFrameLocks noGrp="1" noChangeAspect="1"/>
           </p:cNvGraphicFramePr>
           <p:nvPr>
             <p:ph sz="quarter" idx="2"/>
@@ -17864,7 +17360,7 @@
             </a:extLst>
           </p:cNvPr>
           <p:cNvGraphicFramePr>
-            <a:graphicFrameLocks noChangeAspect="1"/>
+            <a:graphicFrameLocks noGrp="1" noChangeAspect="1"/>
           </p:cNvGraphicFramePr>
           <p:nvPr>
             <p:ph sz="quarter" idx="3"/>
@@ -19703,7 +19199,7 @@
             </a:extLst>
           </p:cNvPr>
           <p:cNvGraphicFramePr>
-            <a:graphicFrameLocks noChangeAspect="1"/>
+            <a:graphicFrameLocks noGrp="1" noChangeAspect="1"/>
           </p:cNvGraphicFramePr>
           <p:nvPr>
             <p:ph idx="1"/>
@@ -23743,14 +23239,18 @@
               </a:spcBef>
             </a:pPr>
             <a:r>
-              <a:rPr lang="es-VE" altLang="es-MX"/>
-              <a:t>Si Cochran &lt; C</a:t>
-            </a:r>
-            <a:r>
-              <a:rPr lang="es-VE" altLang="es-MX" baseline="-25000"/>
+              <a:rPr lang="es-VE" altLang="es-MX" dirty="0"/>
+              <a:t>Si Cochran &gt; </a:t>
+            </a:r>
+            <a:r>
+              <a:rPr lang="es-VE" altLang="es-MX" dirty="0" err="1"/>
+              <a:t>C</a:t>
+            </a:r>
+            <a:r>
+              <a:rPr lang="es-VE" altLang="es-MX" baseline="-25000" dirty="0" err="1"/>
               <a:t>tabulado</a:t>
             </a:r>
-            <a:endParaRPr lang="es-ES" altLang="es-MX" baseline="-25000"/>
+            <a:endParaRPr lang="es-ES" altLang="es-MX" baseline="-25000" dirty="0"/>
           </a:p>
         </p:txBody>
       </p:sp>
@@ -28476,8 +27976,8 @@
           </a:extLst>
         </p:spPr>
       </p:pic>
-      <mc:AlternateContent xmlns:mc="http://schemas.openxmlformats.org/markup-compatibility/2006">
-        <mc:Choice xmlns:a14="http://schemas.microsoft.com/office/drawing/2010/main" Requires="a14">
+      <mc:AlternateContent xmlns:mc="http://schemas.openxmlformats.org/markup-compatibility/2006" xmlns:a14="http://schemas.microsoft.com/office/drawing/2010/main">
+        <mc:Choice Requires="a14">
           <p:sp>
             <p:nvSpPr>
               <p:cNvPr id="7" name="Object 3">
@@ -28624,7 +28124,7 @@
             </p:txBody>
           </p:sp>
         </mc:Choice>
-        <mc:Fallback>
+        <mc:Fallback xmlns="">
           <p:sp>
             <p:nvSpPr>
               <p:cNvPr id="7" name="Object 3">
@@ -30670,7 +30170,7 @@
             </a:extLst>
           </p:cNvPr>
           <p:cNvGraphicFramePr>
-            <a:graphicFrameLocks noChangeAspect="1"/>
+            <a:graphicFrameLocks noGrp="1" noChangeAspect="1"/>
           </p:cNvGraphicFramePr>
           <p:nvPr>
             <p:ph sz="half" idx="2"/>

</xml_diff>